<commit_message>
WEXP: Add intro ppt and update vcs
</commit_message>
<xml_diff>
--- a/presentations/vcs-git-and-github.pptx
+++ b/presentations/vcs-git-and-github.pptx
@@ -6,7 +6,7 @@
     <p:sldMasterId id="2147483806" r:id="rId5"/>
   </p:sldMasterIdLst>
   <p:notesMasterIdLst>
-    <p:notesMasterId r:id="rId22"/>
+    <p:notesMasterId r:id="rId21"/>
   </p:notesMasterIdLst>
   <p:sldIdLst>
     <p:sldId id="256" r:id="rId6"/>
@@ -24,7 +24,6 @@
     <p:sldId id="4512" r:id="rId18"/>
     <p:sldId id="4511" r:id="rId19"/>
     <p:sldId id="4492" r:id="rId20"/>
-    <p:sldId id="266" r:id="rId21"/>
   </p:sldIdLst>
   <p:sldSz cx="12192000" cy="6858000"/>
   <p:notesSz cx="6858000" cy="9144000"/>
@@ -232,7 +231,7 @@
           <a:p>
             <a:fld id="{78B2772D-67CF-446E-AB14-873D70346968}" type="datetimeFigureOut">
               <a:rPr lang="en-GB" smtClean="0"/>
-              <a:t>19/10/2023</a:t>
+              <a:t>28/10/2024</a:t>
             </a:fld>
             <a:endParaRPr lang="en-GB"/>
           </a:p>
@@ -1071,7 +1070,7 @@
           <a:p>
             <a:fld id="{6C25FA03-981D-3F4F-ABFD-F2CAE44CF4DF}" type="datetime1">
               <a:rPr lang="en-GB" smtClean="0"/>
-              <a:t>19/10/2023</a:t>
+              <a:t>28/10/2024</a:t>
             </a:fld>
             <a:endParaRPr lang="en-GB"/>
           </a:p>
@@ -1391,7 +1390,7 @@
           <a:p>
             <a:fld id="{AD447513-F0D7-9140-9852-9A843D8B81D3}" type="datetime1">
               <a:rPr lang="en-GB" smtClean="0"/>
-              <a:t>19/10/2023</a:t>
+              <a:t>28/10/2024</a:t>
             </a:fld>
             <a:endParaRPr lang="en-GB"/>
           </a:p>
@@ -1804,7 +1803,7 @@
           <a:p>
             <a:fld id="{4FC983D9-AEB3-884A-8B61-40B359253CCD}" type="datetime1">
               <a:rPr lang="en-GB" smtClean="0"/>
-              <a:t>19/10/2023</a:t>
+              <a:t>28/10/2024</a:t>
             </a:fld>
             <a:endParaRPr lang="en-GB"/>
           </a:p>
@@ -2839,7 +2838,7 @@
           <a:p>
             <a:fld id="{862EF5BF-54FA-BF48-B61D-2432192EF666}" type="datetime1">
               <a:rPr lang="en-GB" smtClean="0"/>
-              <a:t>19/10/2023</a:t>
+              <a:t>28/10/2024</a:t>
             </a:fld>
             <a:endParaRPr lang="en-GB"/>
           </a:p>
@@ -5958,7 +5957,7 @@
           <a:p>
             <a:fld id="{08B972FC-9C63-1B41-803B-B958A5F6CE25}" type="datetime1">
               <a:rPr lang="en-GB" smtClean="0"/>
-              <a:t>19/10/2023</a:t>
+              <a:t>28/10/2024</a:t>
             </a:fld>
             <a:endParaRPr lang="en-GB"/>
           </a:p>
@@ -6086,7 +6085,7 @@
           <a:p>
             <a:fld id="{05210873-7FD8-1244-ABA1-499AC4AF712B}" type="datetime1">
               <a:rPr lang="en-GB" smtClean="0"/>
-              <a:t>19/10/2023</a:t>
+              <a:t>28/10/2024</a:t>
             </a:fld>
             <a:endParaRPr lang="en-GB"/>
           </a:p>
@@ -6316,7 +6315,7 @@
           <a:p>
             <a:fld id="{5075CE0D-163E-D54F-96AD-C92D6F353048}" type="datetime1">
               <a:rPr lang="en-GB" smtClean="0"/>
-              <a:t>19/10/2023</a:t>
+              <a:t>28/10/2024</a:t>
             </a:fld>
             <a:endParaRPr lang="en-GB"/>
           </a:p>
@@ -7535,7 +7534,7 @@
           </a:ln>
           <a:extLst>
             <a:ext uri="{C572A759-6A51-4108-AA02-DFA0A04FC94B}">
-              <ma14:wrappingTextBoxFlag xmlns:ma14="http://schemas.microsoft.com/office/mac/drawingml/2011/main" xmlns="" val="1"/>
+              <ma14:wrappingTextBoxFlag xmlns="" xmlns:ma14="http://schemas.microsoft.com/office/mac/drawingml/2011/main" val="1"/>
             </a:ext>
           </a:extLst>
         </p:spPr>
@@ -7732,7 +7731,7 @@
           </a:ln>
           <a:extLst>
             <a:ext uri="{C572A759-6A51-4108-AA02-DFA0A04FC94B}">
-              <ma14:wrappingTextBoxFlag xmlns:ma14="http://schemas.microsoft.com/office/mac/drawingml/2011/main" xmlns="" val="1"/>
+              <ma14:wrappingTextBoxFlag xmlns="" xmlns:ma14="http://schemas.microsoft.com/office/mac/drawingml/2011/main" val="1"/>
             </a:ext>
           </a:extLst>
         </p:spPr>
@@ -7995,7 +7994,7 @@
           </a:ln>
           <a:extLst>
             <a:ext uri="{C572A759-6A51-4108-AA02-DFA0A04FC94B}">
-              <ma14:wrappingTextBoxFlag xmlns:ma14="http://schemas.microsoft.com/office/mac/drawingml/2011/main" xmlns="" val="1"/>
+              <ma14:wrappingTextBoxFlag xmlns="" xmlns:ma14="http://schemas.microsoft.com/office/mac/drawingml/2011/main" val="1"/>
             </a:ext>
           </a:extLst>
         </p:spPr>
@@ -9016,7 +9015,7 @@
           <a:p>
             <a:fld id="{330677AC-4808-7844-8878-C4DC36017FAF}" type="datetime1">
               <a:rPr lang="en-GB" smtClean="0"/>
-              <a:t>19/10/2023</a:t>
+              <a:t>28/10/2024</a:t>
             </a:fld>
             <a:endParaRPr lang="en-GB"/>
           </a:p>
@@ -9543,7 +9542,7 @@
           <a:p>
             <a:fld id="{05A8478A-EDB8-3145-A182-C5ED532937CD}" type="datetime1">
               <a:rPr lang="en-GB" smtClean="0"/>
-              <a:t>19/10/2023</a:t>
+              <a:t>28/10/2024</a:t>
             </a:fld>
             <a:endParaRPr lang="en-GB"/>
           </a:p>
@@ -9921,7 +9920,7 @@
           <a:p>
             <a:fld id="{3A861D55-4B75-6148-B497-8307DFA79D9F}" type="datetime1">
               <a:rPr lang="en-GB" smtClean="0"/>
-              <a:t>19/10/2023</a:t>
+              <a:t>28/10/2024</a:t>
             </a:fld>
             <a:endParaRPr lang="en-GB"/>
           </a:p>
@@ -10239,7 +10238,7 @@
           <a:p>
             <a:fld id="{23E27BC6-0B0F-3C48-A90A-106E7F9DC3AC}" type="datetime1">
               <a:rPr lang="en-GB" smtClean="0"/>
-              <a:t>19/10/2023</a:t>
+              <a:t>28/10/2024</a:t>
             </a:fld>
             <a:endParaRPr lang="en-GB"/>
           </a:p>
@@ -10621,7 +10620,7 @@
           <a:p>
             <a:fld id="{52156CEE-F6CC-7B46-8301-E62F55883839}" type="datetime1">
               <a:rPr lang="en-GB" smtClean="0"/>
-              <a:t>19/10/2023</a:t>
+              <a:t>28/10/2024</a:t>
             </a:fld>
             <a:endParaRPr lang="en-GB"/>
           </a:p>
@@ -11003,7 +11002,7 @@
           <a:p>
             <a:fld id="{F44621EF-E3B6-AC44-B311-3F80F8F520D1}" type="datetime1">
               <a:rPr lang="en-GB" smtClean="0"/>
-              <a:t>19/10/2023</a:t>
+              <a:t>28/10/2024</a:t>
             </a:fld>
             <a:endParaRPr lang="en-GB"/>
           </a:p>
@@ -11385,7 +11384,7 @@
           <a:p>
             <a:fld id="{D97C8151-BC5D-0342-B9A9-219468AF0BB5}" type="datetime1">
               <a:rPr lang="en-GB" smtClean="0"/>
-              <a:t>19/10/2023</a:t>
+              <a:t>28/10/2024</a:t>
             </a:fld>
             <a:endParaRPr lang="en-GB"/>
           </a:p>
@@ -11718,7 +11717,7 @@
           <a:p>
             <a:fld id="{31D05CA0-F179-1E48-8911-D48A170F3146}" type="datetime1">
               <a:rPr lang="en-GB" smtClean="0"/>
-              <a:t>19/10/2023</a:t>
+              <a:t>28/10/2024</a:t>
             </a:fld>
             <a:endParaRPr lang="en-GB"/>
           </a:p>
@@ -12991,7 +12990,7 @@
           <a:p>
             <a:r>
               <a:rPr lang="en-GB" dirty="0"/>
-              <a:t>October 2023</a:t>
+              <a:t>October 2024</a:t>
             </a:r>
           </a:p>
         </p:txBody>
@@ -16148,34 +16147,6 @@
       </p:sp>
       <p:sp>
         <p:nvSpPr>
-          <p:cNvPr id="4" name="Footer Placeholder 3">
-            <a:extLst>
-              <a:ext uri="{FF2B5EF4-FFF2-40B4-BE49-F238E27FC236}">
-                <a16:creationId xmlns:a16="http://schemas.microsoft.com/office/drawing/2014/main" id="{8F3824E5-9699-4B33-9D02-5717D5472D31}"/>
-              </a:ext>
-            </a:extLst>
-          </p:cNvPr>
-          <p:cNvSpPr>
-            <a:spLocks noGrp="1"/>
-          </p:cNvSpPr>
-          <p:nvPr>
-            <p:ph type="ftr" sz="quarter" idx="11"/>
-          </p:nvPr>
-        </p:nvSpPr>
-        <p:spPr/>
-        <p:txBody>
-          <a:bodyPr/>
-          <a:lstStyle/>
-          <a:p>
-            <a:r>
-              <a:rPr lang="en-GB"/>
-              <a:t>Delay Repay Updates</a:t>
-            </a:r>
-          </a:p>
-        </p:txBody>
-      </p:sp>
-      <p:sp>
-        <p:nvSpPr>
           <p:cNvPr id="5" name="Slide Number Placeholder 4">
             <a:extLst>
               <a:ext uri="{FF2B5EF4-FFF2-40B4-BE49-F238E27FC236}">
@@ -16237,200 +16208,6 @@
     <p:extLst>
       <p:ext uri="{BB962C8B-B14F-4D97-AF65-F5344CB8AC3E}">
         <p14:creationId xmlns:p14="http://schemas.microsoft.com/office/powerpoint/2010/main" val="995841389"/>
-      </p:ext>
-    </p:extLst>
-  </p:cSld>
-  <p:clrMapOvr>
-    <a:masterClrMapping/>
-  </p:clrMapOvr>
-  <mc:AlternateContent xmlns:mc="http://schemas.openxmlformats.org/markup-compatibility/2006" xmlns:p14="http://schemas.microsoft.com/office/powerpoint/2010/main">
-    <mc:Choice Requires="p14">
-      <p:transition p14:dur="0"/>
-    </mc:Choice>
-    <mc:Fallback xmlns="">
-      <p:transition/>
-    </mc:Fallback>
-  </mc:AlternateContent>
-</p:sld>
-</file>
-
-<file path=ppt/slides/slide16.xml><?xml version="1.0" encoding="utf-8"?>
-<p:sld xmlns:a="http://schemas.openxmlformats.org/drawingml/2006/main" xmlns:r="http://schemas.openxmlformats.org/officeDocument/2006/relationships" xmlns:p="http://schemas.openxmlformats.org/presentationml/2006/main">
-  <p:cSld>
-    <p:spTree>
-      <p:nvGrpSpPr>
-        <p:cNvPr id="1" name=""/>
-        <p:cNvGrpSpPr/>
-        <p:nvPr/>
-      </p:nvGrpSpPr>
-      <p:grpSpPr>
-        <a:xfrm>
-          <a:off x="0" y="0"/>
-          <a:ext cx="0" cy="0"/>
-          <a:chOff x="0" y="0"/>
-          <a:chExt cx="0" cy="0"/>
-        </a:xfrm>
-      </p:grpSpPr>
-      <p:sp>
-        <p:nvSpPr>
-          <p:cNvPr id="5" name="Text Placeholder 4">
-            <a:extLst>
-              <a:ext uri="{FF2B5EF4-FFF2-40B4-BE49-F238E27FC236}">
-                <a16:creationId xmlns:a16="http://schemas.microsoft.com/office/drawing/2014/main" id="{FA505209-A882-490B-B276-3DA9129225E5}"/>
-              </a:ext>
-            </a:extLst>
-          </p:cNvPr>
-          <p:cNvSpPr>
-            <a:spLocks noGrp="1"/>
-          </p:cNvSpPr>
-          <p:nvPr>
-            <p:ph type="body" sz="quarter" idx="13"/>
-          </p:nvPr>
-        </p:nvSpPr>
-        <p:spPr/>
-        <p:txBody>
-          <a:bodyPr vert="horz" lIns="0" tIns="0" rIns="0" bIns="0" rtlCol="0" anchor="t">
-            <a:noAutofit/>
-          </a:bodyPr>
-          <a:lstStyle/>
-          <a:p>
-            <a:r>
-              <a:rPr lang="en-GB" dirty="0"/>
-              <a:t>Kris Gwynne</a:t>
-            </a:r>
-            <a:endParaRPr lang="en-US" dirty="0"/>
-          </a:p>
-          <a:p>
-            <a:pPr lvl="1"/>
-            <a:r>
-              <a:rPr lang="en-GB" dirty="0"/>
-              <a:t>Software Developer</a:t>
-            </a:r>
-          </a:p>
-        </p:txBody>
-      </p:sp>
-      <p:sp>
-        <p:nvSpPr>
-          <p:cNvPr id="6" name="Text Placeholder 5">
-            <a:extLst>
-              <a:ext uri="{FF2B5EF4-FFF2-40B4-BE49-F238E27FC236}">
-                <a16:creationId xmlns:a16="http://schemas.microsoft.com/office/drawing/2014/main" id="{D88FF59F-0424-4A8B-A680-3575D2C510A2}"/>
-              </a:ext>
-            </a:extLst>
-          </p:cNvPr>
-          <p:cNvSpPr>
-            <a:spLocks noGrp="1"/>
-          </p:cNvSpPr>
-          <p:nvPr>
-            <p:ph type="body" sz="quarter" idx="14"/>
-          </p:nvPr>
-        </p:nvSpPr>
-        <p:spPr>
-          <a:xfrm>
-            <a:off x="447678" y="4797425"/>
-            <a:ext cx="2942493" cy="1028700"/>
-          </a:xfrm>
-        </p:spPr>
-        <p:txBody>
-          <a:bodyPr vert="horz" lIns="0" tIns="0" rIns="0" bIns="0" rtlCol="0" anchor="t">
-            <a:noAutofit/>
-          </a:bodyPr>
-          <a:lstStyle/>
-          <a:p>
-            <a:r>
-              <a:rPr lang="en-GB" dirty="0" err="1"/>
-              <a:t>Kris.gwynne@softwire.com</a:t>
-            </a:r>
-            <a:endParaRPr lang="en-GB" dirty="0"/>
-          </a:p>
-        </p:txBody>
-      </p:sp>
-      <p:sp>
-        <p:nvSpPr>
-          <p:cNvPr id="7" name="Text Placeholder 6">
-            <a:extLst>
-              <a:ext uri="{FF2B5EF4-FFF2-40B4-BE49-F238E27FC236}">
-                <a16:creationId xmlns:a16="http://schemas.microsoft.com/office/drawing/2014/main" id="{3D4B2D39-28AC-4B3B-8068-2C3436F7DDCE}"/>
-              </a:ext>
-            </a:extLst>
-          </p:cNvPr>
-          <p:cNvSpPr>
-            <a:spLocks noGrp="1"/>
-          </p:cNvSpPr>
-          <p:nvPr>
-            <p:ph type="body" sz="quarter" idx="15"/>
-          </p:nvPr>
-        </p:nvSpPr>
-        <p:spPr>
-          <a:xfrm>
-            <a:off x="3503594" y="4797425"/>
-            <a:ext cx="2590801" cy="1028700"/>
-          </a:xfrm>
-        </p:spPr>
-        <p:txBody>
-          <a:bodyPr/>
-          <a:lstStyle/>
-          <a:p>
-            <a:r>
-              <a:rPr lang="en-GB"/>
-              <a:t>Suite 110, Highgate Studios</a:t>
-            </a:r>
-          </a:p>
-          <a:p>
-            <a:r>
-              <a:rPr lang="en-GB"/>
-              <a:t>53-79 Highgate Road</a:t>
-            </a:r>
-          </a:p>
-          <a:p>
-            <a:r>
-              <a:rPr lang="en-GB"/>
-              <a:t>London NW5 1TL</a:t>
-            </a:r>
-          </a:p>
-          <a:p>
-            <a:endParaRPr lang="en-GB"/>
-          </a:p>
-        </p:txBody>
-      </p:sp>
-      <p:sp>
-        <p:nvSpPr>
-          <p:cNvPr id="8" name="Text Placeholder 7">
-            <a:extLst>
-              <a:ext uri="{FF2B5EF4-FFF2-40B4-BE49-F238E27FC236}">
-                <a16:creationId xmlns:a16="http://schemas.microsoft.com/office/drawing/2014/main" id="{A80E7D1B-F2E3-4636-8DFF-F737E21A56D1}"/>
-              </a:ext>
-            </a:extLst>
-          </p:cNvPr>
-          <p:cNvSpPr>
-            <a:spLocks noGrp="1"/>
-          </p:cNvSpPr>
-          <p:nvPr>
-            <p:ph type="body" sz="quarter" idx="16"/>
-          </p:nvPr>
-        </p:nvSpPr>
-        <p:spPr/>
-        <p:txBody>
-          <a:bodyPr/>
-          <a:lstStyle/>
-          <a:p>
-            <a:r>
-              <a:rPr lang="en-GB"/>
-              <a:t>Copyright © Softwire 2021</a:t>
-            </a:r>
-          </a:p>
-          <a:p>
-            <a:r>
-              <a:rPr lang="en-GB"/>
-              <a:t>All rights reserved</a:t>
-            </a:r>
-          </a:p>
-        </p:txBody>
-      </p:sp>
-    </p:spTree>
-    <p:extLst>
-      <p:ext uri="{BB962C8B-B14F-4D97-AF65-F5344CB8AC3E}">
-        <p14:creationId xmlns:p14="http://schemas.microsoft.com/office/powerpoint/2010/main" val="3645926513"/>
       </p:ext>
     </p:extLst>
   </p:cSld>
@@ -20637,6 +20414,21 @@
 </file>
 
 <file path=customXml/item1.xml><?xml version="1.0" encoding="utf-8"?>
+<?mso-contentType ?>
+<FormTemplates xmlns="http://schemas.microsoft.com/sharepoint/v3/contenttype/forms">
+  <Display>DocumentLibraryForm</Display>
+  <Edit>DocumentLibraryForm</Edit>
+  <New>DocumentLibraryForm</New>
+</FormTemplates>
+</file>
+
+<file path=customXml/item2.xml><?xml version="1.0" encoding="utf-8"?>
+<p:properties xmlns:p="http://schemas.microsoft.com/office/2006/metadata/properties" xmlns:xsi="http://www.w3.org/2001/XMLSchema-instance" xmlns:pc="http://schemas.microsoft.com/office/infopath/2007/PartnerControls">
+  <documentManagement/>
+</p:properties>
+</file>
+
+<file path=customXml/item3.xml><?xml version="1.0" encoding="utf-8"?>
 <ct:contentTypeSchema xmlns:ct="http://schemas.microsoft.com/office/2006/metadata/contentType" xmlns:ma="http://schemas.microsoft.com/office/2006/metadata/properties/metaAttributes" ct:_="" ma:_="" ma:contentTypeName="Document" ma:contentTypeID="0x010100C41CF2333F1C904B80A4811D68B50097" ma:contentTypeVersion="12" ma:contentTypeDescription="Create a new document." ma:contentTypeScope="" ma:versionID="ed495581af461ca466c171f5b872cd83">
   <xsd:schema xmlns:xsd="http://www.w3.org/2001/XMLSchema" xmlns:xs="http://www.w3.org/2001/XMLSchema" xmlns:p="http://schemas.microsoft.com/office/2006/metadata/properties" xmlns:ns2="b3e7612e-fdb2-4974-b106-74dc7088542d" xmlns:ns3="16822fe8-4949-411e-b509-0583e0da6ec6" targetNamespace="http://schemas.microsoft.com/office/2006/metadata/properties" ma:root="true" ma:fieldsID="b031bb905399b1b75517dac07ffd7c20" ns2:_="" ns3:_="">
     <xsd:import namespace="b3e7612e-fdb2-4974-b106-74dc7088542d"/>
@@ -20853,36 +20645,10 @@
 </ct:contentTypeSchema>
 </file>
 
-<file path=customXml/item2.xml><?xml version="1.0" encoding="utf-8"?>
-<p:properties xmlns:p="http://schemas.microsoft.com/office/2006/metadata/properties" xmlns:xsi="http://www.w3.org/2001/XMLSchema-instance" xmlns:pc="http://schemas.microsoft.com/office/infopath/2007/PartnerControls">
-  <documentManagement/>
-</p:properties>
-</file>
-
-<file path=customXml/item3.xml><?xml version="1.0" encoding="utf-8"?>
-<?mso-contentType ?>
-<FormTemplates xmlns="http://schemas.microsoft.com/sharepoint/v3/contenttype/forms">
-  <Display>DocumentLibraryForm</Display>
-  <Edit>DocumentLibraryForm</Edit>
-  <New>DocumentLibraryForm</New>
-</FormTemplates>
-</file>
-
 <file path=customXml/itemProps1.xml><?xml version="1.0" encoding="utf-8"?>
-<ds:datastoreItem xmlns:ds="http://schemas.openxmlformats.org/officeDocument/2006/customXml" ds:itemID="{4AEDF40A-C432-41BD-9360-5BDA75CC15AC}">
+<ds:datastoreItem xmlns:ds="http://schemas.openxmlformats.org/officeDocument/2006/customXml" ds:itemID="{CE1CAEE4-FACD-4E29-9FA2-1415ACCF9B2B}">
   <ds:schemaRefs>
-    <ds:schemaRef ds:uri="16822fe8-4949-411e-b509-0583e0da6ec6"/>
-    <ds:schemaRef ds:uri="b3e7612e-fdb2-4974-b106-74dc7088542d"/>
-    <ds:schemaRef ds:uri="http://purl.org/dc/elements/1.1/"/>
-    <ds:schemaRef ds:uri="http://purl.org/dc/terms/"/>
-    <ds:schemaRef ds:uri="http://schemas.microsoft.com/internal/obd"/>
-    <ds:schemaRef ds:uri="http://schemas.microsoft.com/office/2006/documentManagement/types"/>
-    <ds:schemaRef ds:uri="http://schemas.microsoft.com/office/2006/metadata/contentType"/>
-    <ds:schemaRef ds:uri="http://schemas.microsoft.com/office/2006/metadata/properties"/>
-    <ds:schemaRef ds:uri="http://schemas.microsoft.com/office/2006/metadata/properties/metaAttributes"/>
-    <ds:schemaRef ds:uri="http://schemas.microsoft.com/office/infopath/2007/PartnerControls"/>
-    <ds:schemaRef ds:uri="http://schemas.openxmlformats.org/package/2006/metadata/core-properties"/>
-    <ds:schemaRef ds:uri="http://www.w3.org/2001/XMLSchema"/>
+    <ds:schemaRef ds:uri="http://schemas.microsoft.com/sharepoint/v3/contenttype/forms"/>
   </ds:schemaRefs>
 </ds:datastoreItem>
 </file>
@@ -20905,9 +20671,20 @@
 </file>
 
 <file path=customXml/itemProps3.xml><?xml version="1.0" encoding="utf-8"?>
-<ds:datastoreItem xmlns:ds="http://schemas.openxmlformats.org/officeDocument/2006/customXml" ds:itemID="{CE1CAEE4-FACD-4E29-9FA2-1415ACCF9B2B}">
+<ds:datastoreItem xmlns:ds="http://schemas.openxmlformats.org/officeDocument/2006/customXml" ds:itemID="{4AEDF40A-C432-41BD-9360-5BDA75CC15AC}">
   <ds:schemaRefs>
-    <ds:schemaRef ds:uri="http://schemas.microsoft.com/sharepoint/v3/contenttype/forms"/>
+    <ds:schemaRef ds:uri="16822fe8-4949-411e-b509-0583e0da6ec6"/>
+    <ds:schemaRef ds:uri="b3e7612e-fdb2-4974-b106-74dc7088542d"/>
+    <ds:schemaRef ds:uri="http://purl.org/dc/elements/1.1/"/>
+    <ds:schemaRef ds:uri="http://purl.org/dc/terms/"/>
+    <ds:schemaRef ds:uri="http://schemas.microsoft.com/internal/obd"/>
+    <ds:schemaRef ds:uri="http://schemas.microsoft.com/office/2006/documentManagement/types"/>
+    <ds:schemaRef ds:uri="http://schemas.microsoft.com/office/2006/metadata/contentType"/>
+    <ds:schemaRef ds:uri="http://schemas.microsoft.com/office/2006/metadata/properties"/>
+    <ds:schemaRef ds:uri="http://schemas.microsoft.com/office/2006/metadata/properties/metaAttributes"/>
+    <ds:schemaRef ds:uri="http://schemas.microsoft.com/office/infopath/2007/PartnerControls"/>
+    <ds:schemaRef ds:uri="http://schemas.openxmlformats.org/package/2006/metadata/core-properties"/>
+    <ds:schemaRef ds:uri="http://www.w3.org/2001/XMLSchema"/>
   </ds:schemaRefs>
 </ds:datastoreItem>
 </file>
</xml_diff>